<commit_message>
Atualização relatório e PPT
</commit_message>
<xml_diff>
--- a/Tradutores.pptx
+++ b/Tradutores.pptx
@@ -12,7 +12,8 @@
     <p:sldId id="259" r:id="rId6"/>
     <p:sldId id="261" r:id="rId7"/>
     <p:sldId id="262" r:id="rId8"/>
-    <p:sldId id="263" r:id="rId9"/>
+    <p:sldId id="264" r:id="rId9"/>
+    <p:sldId id="263" r:id="rId10"/>
   </p:sldIdLst>
   <p:sldSz cx="12192000" cy="6858000"/>
   <p:notesSz cx="6858000" cy="9144000"/>
@@ -272,7 +273,7 @@
           <a:p>
             <a:fld id="{D1D1EADE-8E88-4C7C-8AC5-FB148DE4940E}" type="datetime1">
               <a:rPr lang="en-US" smtClean="0"/>
-              <a:t>9/25/2025</a:t>
+              <a:t>9/26/2025</a:t>
             </a:fld>
             <a:endParaRPr lang="en-US"/>
           </a:p>
@@ -472,7 +473,7 @@
           <a:p>
             <a:fld id="{EC3C8B9C-477D-492A-96AD-1FC2CC997A73}" type="datetime1">
               <a:rPr lang="en-US" smtClean="0"/>
-              <a:t>9/25/2025</a:t>
+              <a:t>9/26/2025</a:t>
             </a:fld>
             <a:endParaRPr lang="en-US"/>
           </a:p>
@@ -682,7 +683,7 @@
           <a:p>
             <a:fld id="{42D3AED5-E26D-4E29-B1B3-7847B6779594}" type="datetime1">
               <a:rPr lang="en-US" smtClean="0"/>
-              <a:t>9/25/2025</a:t>
+              <a:t>9/26/2025</a:t>
             </a:fld>
             <a:endParaRPr lang="en-US"/>
           </a:p>
@@ -882,7 +883,7 @@
           <a:p>
             <a:fld id="{157B6794-849E-4626-908B-D15793550EFB}" type="datetime1">
               <a:rPr lang="en-US" smtClean="0"/>
-              <a:t>9/25/2025</a:t>
+              <a:t>9/26/2025</a:t>
             </a:fld>
             <a:endParaRPr lang="en-US"/>
           </a:p>
@@ -1158,7 +1159,7 @@
           <a:p>
             <a:fld id="{63DB64E7-5594-42A3-ADBF-E95A7ACEAD64}" type="datetime1">
               <a:rPr lang="en-US" smtClean="0"/>
-              <a:t>9/25/2025</a:t>
+              <a:t>9/26/2025</a:t>
             </a:fld>
             <a:endParaRPr lang="en-US"/>
           </a:p>
@@ -1431,7 +1432,7 @@
           <a:p>
             <a:fld id="{18462B0B-D248-4FFB-8695-AD7FA4B1284A}" type="datetime1">
               <a:rPr lang="en-US" smtClean="0"/>
-              <a:t>9/25/2025</a:t>
+              <a:t>9/26/2025</a:t>
             </a:fld>
             <a:endParaRPr lang="en-US"/>
           </a:p>
@@ -1854,7 +1855,7 @@
           <a:p>
             <a:fld id="{D0378EFB-9159-4510-B73F-4F0409ADE937}" type="datetime1">
               <a:rPr lang="en-US" smtClean="0"/>
-              <a:t>9/25/2025</a:t>
+              <a:t>9/26/2025</a:t>
             </a:fld>
             <a:endParaRPr lang="en-US"/>
           </a:p>
@@ -1996,7 +1997,7 @@
           <a:p>
             <a:fld id="{89BC9412-2452-4BED-A324-9D8C115361AD}" type="datetime1">
               <a:rPr lang="en-US" smtClean="0"/>
-              <a:t>9/25/2025</a:t>
+              <a:t>9/26/2025</a:t>
             </a:fld>
             <a:endParaRPr lang="en-US"/>
           </a:p>
@@ -2109,7 +2110,7 @@
           <a:p>
             <a:fld id="{F5318F62-D251-40E8-A23C-F4CFE9FEAB41}" type="datetime1">
               <a:rPr lang="en-US" smtClean="0"/>
-              <a:t>9/25/2025</a:t>
+              <a:t>9/26/2025</a:t>
             </a:fld>
             <a:endParaRPr lang="en-US"/>
           </a:p>
@@ -2422,7 +2423,7 @@
           <a:p>
             <a:fld id="{44F76144-149E-4874-93A5-554A0357CF82}" type="datetime1">
               <a:rPr lang="en-US" smtClean="0"/>
-              <a:t>9/25/2025</a:t>
+              <a:t>9/26/2025</a:t>
             </a:fld>
             <a:endParaRPr lang="en-US"/>
           </a:p>
@@ -2715,7 +2716,7 @@
           <a:p>
             <a:fld id="{50BA65D8-0540-4835-AE5C-25D29DBA01BE}" type="datetime1">
               <a:rPr lang="en-US" smtClean="0"/>
-              <a:t>9/25/2025</a:t>
+              <a:t>9/26/2025</a:t>
             </a:fld>
             <a:endParaRPr lang="en-US"/>
           </a:p>
@@ -2957,7 +2958,7 @@
           <a:p>
             <a:fld id="{E31BA835-12AC-4E8F-955A-EA3F4DE2791F}" type="datetime1">
               <a:rPr lang="en-US" smtClean="0"/>
-              <a:t>9/25/2025</a:t>
+              <a:t>9/26/2025</a:t>
             </a:fld>
             <a:endParaRPr lang="en-US"/>
           </a:p>
@@ -7046,6 +7047,150 @@
 </file>
 
 <file path=ppt/slides/slide8.xml><?xml version="1.0" encoding="utf-8"?>
+<p:sld xmlns:a="http://schemas.openxmlformats.org/drawingml/2006/main" xmlns:r="http://schemas.openxmlformats.org/officeDocument/2006/relationships" xmlns:p="http://schemas.openxmlformats.org/presentationml/2006/main">
+  <p:cSld>
+    <p:spTree>
+      <p:nvGrpSpPr>
+        <p:cNvPr id="1" name=""/>
+        <p:cNvGrpSpPr/>
+        <p:nvPr/>
+      </p:nvGrpSpPr>
+      <p:grpSpPr>
+        <a:xfrm>
+          <a:off x="0" y="0"/>
+          <a:ext cx="0" cy="0"/>
+          <a:chOff x="0" y="0"/>
+          <a:chExt cx="0" cy="0"/>
+        </a:xfrm>
+      </p:grpSpPr>
+      <p:pic>
+        <p:nvPicPr>
+          <p:cNvPr id="6" name="Picture 3" descr="Um padrão abstrato de aquarela azul sobre uma tela de fundo branco">
+            <a:extLst>
+              <a:ext uri="{FF2B5EF4-FFF2-40B4-BE49-F238E27FC236}">
+                <a16:creationId xmlns:a16="http://schemas.microsoft.com/office/drawing/2014/main" id="{B90BB288-0399-4372-83F1-296BD9ECB39C}"/>
+              </a:ext>
+            </a:extLst>
+          </p:cNvPr>
+          <p:cNvPicPr>
+            <a:picLocks noChangeAspect="1"/>
+          </p:cNvPicPr>
+          <p:nvPr/>
+        </p:nvPicPr>
+        <p:blipFill>
+          <a:blip r:embed="rId2"/>
+          <a:srcRect l="16489" r="26418" b="-1"/>
+          <a:stretch>
+            <a:fillRect/>
+          </a:stretch>
+        </p:blipFill>
+        <p:spPr>
+          <a:xfrm>
+            <a:off x="6326273" y="10"/>
+            <a:ext cx="5865727" cy="6857990"/>
+          </a:xfrm>
+          <a:prstGeom prst="rect">
+            <a:avLst/>
+          </a:prstGeom>
+        </p:spPr>
+      </p:pic>
+      <p:sp>
+        <p:nvSpPr>
+          <p:cNvPr id="2" name="Título 1">
+            <a:extLst>
+              <a:ext uri="{FF2B5EF4-FFF2-40B4-BE49-F238E27FC236}">
+                <a16:creationId xmlns:a16="http://schemas.microsoft.com/office/drawing/2014/main" id="{CA6AA267-DA0E-7E49-12EB-29DB535BB0D7}"/>
+              </a:ext>
+            </a:extLst>
+          </p:cNvPr>
+          <p:cNvSpPr>
+            <a:spLocks noGrp="1"/>
+          </p:cNvSpPr>
+          <p:nvPr>
+            <p:ph type="title"/>
+          </p:nvPr>
+        </p:nvSpPr>
+        <p:spPr/>
+        <p:txBody>
+          <a:bodyPr/>
+          <a:lstStyle/>
+          <a:p>
+            <a:r>
+              <a:rPr lang="pt-BR" dirty="0"/>
+              <a:t>Tabela de cadeias</a:t>
+            </a:r>
+          </a:p>
+        </p:txBody>
+      </p:sp>
+      <p:sp>
+        <p:nvSpPr>
+          <p:cNvPr id="3" name="Espaço Reservado para Conteúdo 2">
+            <a:extLst>
+              <a:ext uri="{FF2B5EF4-FFF2-40B4-BE49-F238E27FC236}">
+                <a16:creationId xmlns:a16="http://schemas.microsoft.com/office/drawing/2014/main" id="{8FDF51FB-6EC8-56B8-D321-A0DE8FF08A56}"/>
+              </a:ext>
+            </a:extLst>
+          </p:cNvPr>
+          <p:cNvSpPr>
+            <a:spLocks noGrp="1"/>
+          </p:cNvSpPr>
+          <p:nvPr>
+            <p:ph idx="1"/>
+          </p:nvPr>
+        </p:nvSpPr>
+        <p:spPr/>
+        <p:txBody>
+          <a:bodyPr/>
+          <a:lstStyle/>
+          <a:p>
+            <a:endParaRPr lang="pt-BR" dirty="0"/>
+          </a:p>
+        </p:txBody>
+      </p:sp>
+      <p:pic>
+        <p:nvPicPr>
+          <p:cNvPr id="8" name="Imagem 7">
+            <a:extLst>
+              <a:ext uri="{FF2B5EF4-FFF2-40B4-BE49-F238E27FC236}">
+                <a16:creationId xmlns:a16="http://schemas.microsoft.com/office/drawing/2014/main" id="{1DEA6E4F-9009-9335-9D0A-0FE1A1BE687E}"/>
+              </a:ext>
+            </a:extLst>
+          </p:cNvPr>
+          <p:cNvPicPr>
+            <a:picLocks noChangeAspect="1"/>
+          </p:cNvPicPr>
+          <p:nvPr/>
+        </p:nvPicPr>
+        <p:blipFill>
+          <a:blip r:embed="rId3"/>
+          <a:stretch>
+            <a:fillRect/>
+          </a:stretch>
+        </p:blipFill>
+        <p:spPr>
+          <a:xfrm>
+            <a:off x="6391711" y="1847469"/>
+            <a:ext cx="5734850" cy="3639058"/>
+          </a:xfrm>
+          <a:prstGeom prst="rect">
+            <a:avLst/>
+          </a:prstGeom>
+        </p:spPr>
+      </p:pic>
+    </p:spTree>
+    <p:extLst>
+      <p:ext uri="{BB962C8B-B14F-4D97-AF65-F5344CB8AC3E}">
+        <p14:creationId xmlns:p14="http://schemas.microsoft.com/office/powerpoint/2010/main" val="2606305978"/>
+      </p:ext>
+    </p:extLst>
+  </p:cSld>
+  <p:clrMapOvr>
+    <a:masterClrMapping/>
+  </p:clrMapOvr>
+</p:sld>
+</file>
+
+<file path=ppt/slides/slide9.xml><?xml version="1.0" encoding="utf-8"?>
 <p:sld xmlns:a="http://schemas.openxmlformats.org/drawingml/2006/main" xmlns:r="http://schemas.openxmlformats.org/officeDocument/2006/relationships" xmlns:p="http://schemas.openxmlformats.org/presentationml/2006/main">
   <p:cSld>
     <p:bg>

</xml_diff>